<commit_message>
Implementação da lógica principal do jogo.
- O jogo ja pode ser jogado no modo normal 4x4. Os demais controles como: Salvar Jogo, Reiniciar Jogo e Ranking, ainda não estão funcionando;

- Incluindo arquivos para a apresentação do projeto.
</commit_message>
<xml_diff>
--- a/Apresentação jogo 2048.pptx
+++ b/Apresentação jogo 2048.pptx
@@ -129,6 +129,18 @@
 </p:presentation>
 </file>
 
+<file path=ppt/commentAuthors.xml><?xml version="1.0" encoding="utf-8"?>
+<p:cmAuthorLst xmlns:a="http://schemas.openxmlformats.org/drawingml/2006/main" xmlns:r="http://schemas.openxmlformats.org/officeDocument/2006/relationships" xmlns:p="http://schemas.openxmlformats.org/presentationml/2006/main">
+  <p:cmAuthor id="1" name="Pedro Rocha" initials="PR" lastIdx="1" clrIdx="0">
+    <p:extLst>
+      <p:ext uri="{19B8F6BF-5375-455C-9EA6-DF929625EA0E}">
+        <p15:presenceInfo xmlns:p15="http://schemas.microsoft.com/office/powerpoint/2012/main" userId="5c3465458365bb1a" providerId="Windows Live"/>
+      </p:ext>
+    </p:extLst>
+  </p:cmAuthor>
+</p:cmAuthorLst>
+</file>
+
 <file path=ppt/slideLayouts/slideLayout1.xml><?xml version="1.0" encoding="utf-8"?>
 <p:sldLayout xmlns:a="http://schemas.openxmlformats.org/drawingml/2006/main" xmlns:r="http://schemas.openxmlformats.org/officeDocument/2006/relationships" xmlns:p="http://schemas.openxmlformats.org/presentationml/2006/main" type="title" preserve="1">
   <p:cSld name="Title Slide">
@@ -314,7 +326,7 @@
           <a:p>
             <a:fld id="{88D38747-4367-4BD2-8D51-C97E202738E2}" type="datetime1">
               <a:rPr lang="en-US" smtClean="0"/>
-              <a:t>4/28/2022</a:t>
+              <a:t>5/5/2022</a:t>
             </a:fld>
             <a:endParaRPr lang="en-US" dirty="0"/>
           </a:p>
@@ -357,7 +369,7 @@
             <a:fld id="{3A98EE3D-8CD1-4C3F-BD1C-C98C9596463C}" type="slidenum">
               <a:rPr lang="en-US" smtClean="0"/>
               <a:pPr/>
-              <a:t>‹nº›</a:t>
+              <a:t>‹#›</a:t>
             </a:fld>
             <a:endParaRPr lang="en-US" dirty="0"/>
           </a:p>
@@ -618,7 +630,7 @@
           <a:p>
             <a:fld id="{11F1B079-7EF0-44EE-B798-BCC497C9F3B2}" type="datetime1">
               <a:rPr lang="en-US" smtClean="0"/>
-              <a:t>4/28/2022</a:t>
+              <a:t>5/5/2022</a:t>
             </a:fld>
             <a:endParaRPr lang="en-US" dirty="0"/>
           </a:p>
@@ -660,7 +672,7 @@
           <a:p>
             <a:fld id="{3A98EE3D-8CD1-4C3F-BD1C-C98C9596463C}" type="slidenum">
               <a:rPr lang="en-US" smtClean="0"/>
-              <a:t>‹nº›</a:t>
+              <a:t>‹#›</a:t>
             </a:fld>
             <a:endParaRPr lang="en-US" dirty="0"/>
           </a:p>
@@ -812,7 +824,7 @@
           <a:p>
             <a:fld id="{28FF70A8-1D13-4657-95F0-A9EA54967B8D}" type="datetime1">
               <a:rPr lang="en-US" smtClean="0"/>
-              <a:t>4/28/2022</a:t>
+              <a:t>5/5/2022</a:t>
             </a:fld>
             <a:endParaRPr lang="en-US" dirty="0"/>
           </a:p>
@@ -854,7 +866,7 @@
           <a:p>
             <a:fld id="{3A98EE3D-8CD1-4C3F-BD1C-C98C9596463C}" type="slidenum">
               <a:rPr lang="en-US" smtClean="0"/>
-              <a:t>‹nº›</a:t>
+              <a:t>‹#›</a:t>
             </a:fld>
             <a:endParaRPr lang="en-US" dirty="0"/>
           </a:p>
@@ -1075,7 +1087,7 @@
           <a:p>
             <a:fld id="{21EB90AC-71BD-4C7F-8ACA-7B3F18292E63}" type="datetime1">
               <a:rPr lang="en-US" smtClean="0"/>
-              <a:t>4/28/2022</a:t>
+              <a:t>5/5/2022</a:t>
             </a:fld>
             <a:endParaRPr lang="en-US" dirty="0"/>
           </a:p>
@@ -1117,7 +1129,7 @@
           <a:p>
             <a:fld id="{3A98EE3D-8CD1-4C3F-BD1C-C98C9596463C}" type="slidenum">
               <a:rPr lang="en-US" smtClean="0"/>
-              <a:t>‹nº›</a:t>
+              <a:t>‹#›</a:t>
             </a:fld>
             <a:endParaRPr lang="en-US" dirty="0"/>
           </a:p>
@@ -1511,7 +1523,7 @@
           <a:p>
             <a:fld id="{4E6EFC2C-8905-46F0-B443-CE905B76BA01}" type="datetime1">
               <a:rPr lang="en-US" smtClean="0"/>
-              <a:t>4/28/2022</a:t>
+              <a:t>5/5/2022</a:t>
             </a:fld>
             <a:endParaRPr lang="en-US" dirty="0"/>
           </a:p>
@@ -1553,7 +1565,7 @@
           <a:p>
             <a:fld id="{3A98EE3D-8CD1-4C3F-BD1C-C98C9596463C}" type="slidenum">
               <a:rPr lang="en-US" smtClean="0"/>
-              <a:t>‹nº›</a:t>
+              <a:t>‹#›</a:t>
             </a:fld>
             <a:endParaRPr lang="en-US" dirty="0"/>
           </a:p>
@@ -2048,7 +2060,7 @@
           <a:p>
             <a:fld id="{D9079DC3-C9B5-499E-9140-0DC28B7074E2}" type="datetime1">
               <a:rPr lang="en-US" smtClean="0"/>
-              <a:t>4/28/2022</a:t>
+              <a:t>5/5/2022</a:t>
             </a:fld>
             <a:endParaRPr lang="en-US" dirty="0"/>
           </a:p>
@@ -2090,7 +2102,7 @@
           <a:p>
             <a:fld id="{3A98EE3D-8CD1-4C3F-BD1C-C98C9596463C}" type="slidenum">
               <a:rPr lang="en-US" smtClean="0"/>
-              <a:t>‹nº›</a:t>
+              <a:t>‹#›</a:t>
             </a:fld>
             <a:endParaRPr lang="en-US" dirty="0"/>
           </a:p>
@@ -2927,7 +2939,7 @@
           <a:p>
             <a:fld id="{30BB33EA-E472-4D22-9C03-A9C14AA21CED}" type="datetime1">
               <a:rPr lang="en-US" smtClean="0"/>
-              <a:t>4/28/2022</a:t>
+              <a:t>5/5/2022</a:t>
             </a:fld>
             <a:endParaRPr lang="en-US" dirty="0"/>
           </a:p>
@@ -2969,7 +2981,7 @@
           <a:p>
             <a:fld id="{3A98EE3D-8CD1-4C3F-BD1C-C98C9596463C}" type="slidenum">
               <a:rPr lang="en-US" smtClean="0"/>
-              <a:t>‹nº›</a:t>
+              <a:t>‹#›</a:t>
             </a:fld>
             <a:endParaRPr lang="en-US" dirty="0"/>
           </a:p>
@@ -3097,7 +3109,7 @@
           <a:p>
             <a:fld id="{73C55A3C-5767-4844-A0A3-83778C2E5409}" type="datetime1">
               <a:rPr lang="en-US" smtClean="0"/>
-              <a:t>4/28/2022</a:t>
+              <a:t>5/5/2022</a:t>
             </a:fld>
             <a:endParaRPr lang="en-US" dirty="0"/>
           </a:p>
@@ -3139,7 +3151,7 @@
           <a:p>
             <a:fld id="{3A98EE3D-8CD1-4C3F-BD1C-C98C9596463C}" type="slidenum">
               <a:rPr lang="en-US" smtClean="0"/>
-              <a:t>‹nº›</a:t>
+              <a:t>‹#›</a:t>
             </a:fld>
             <a:endParaRPr lang="en-US" dirty="0"/>
           </a:p>
@@ -3341,7 +3353,7 @@
           <a:p>
             <a:fld id="{CAE507A8-A5CF-4D38-AB86-7EDDA87A85D4}" type="datetime1">
               <a:rPr lang="en-US" smtClean="0"/>
-              <a:t>4/28/2022</a:t>
+              <a:t>5/5/2022</a:t>
             </a:fld>
             <a:endParaRPr lang="en-US" dirty="0"/>
           </a:p>
@@ -3384,7 +3396,7 @@
             <a:fld id="{3A98EE3D-8CD1-4C3F-BD1C-C98C9596463C}" type="slidenum">
               <a:rPr lang="en-US" smtClean="0"/>
               <a:pPr/>
-              <a:t>‹nº›</a:t>
+              <a:t>‹#›</a:t>
             </a:fld>
             <a:endParaRPr lang="en-US" dirty="0"/>
           </a:p>
@@ -3583,7 +3595,7 @@
           <a:p>
             <a:fld id="{BDFCD27C-8599-43EF-BA1D-14DDC1946E06}" type="datetime1">
               <a:rPr lang="en-US" smtClean="0"/>
-              <a:t>4/28/2022</a:t>
+              <a:t>5/5/2022</a:t>
             </a:fld>
             <a:endParaRPr lang="en-US" dirty="0"/>
           </a:p>
@@ -3625,7 +3637,7 @@
           <a:p>
             <a:fld id="{3A98EE3D-8CD1-4C3F-BD1C-C98C9596463C}" type="slidenum">
               <a:rPr lang="en-US" smtClean="0"/>
-              <a:t>‹nº›</a:t>
+              <a:t>‹#›</a:t>
             </a:fld>
             <a:endParaRPr lang="en-US" dirty="0"/>
           </a:p>
@@ -4066,7 +4078,7 @@
           <a:p>
             <a:fld id="{49343D99-809A-49C0-96E5-4250D0B498EE}" type="datetime1">
               <a:rPr lang="en-US" smtClean="0"/>
-              <a:t>4/28/2022</a:t>
+              <a:t>5/5/2022</a:t>
             </a:fld>
             <a:endParaRPr lang="en-US" dirty="0"/>
           </a:p>
@@ -4108,7 +4120,7 @@
           <a:p>
             <a:fld id="{3A98EE3D-8CD1-4C3F-BD1C-C98C9596463C}" type="slidenum">
               <a:rPr lang="en-US" smtClean="0"/>
-              <a:t>‹nº›</a:t>
+              <a:t>‹#›</a:t>
             </a:fld>
             <a:endParaRPr lang="en-US" dirty="0"/>
           </a:p>
@@ -4184,7 +4196,7 @@
           <a:p>
             <a:fld id="{A143DE9B-B678-4EFB-BB7D-A4370204A0B0}" type="datetime1">
               <a:rPr lang="en-US" smtClean="0"/>
-              <a:t>4/28/2022</a:t>
+              <a:t>5/5/2022</a:t>
             </a:fld>
             <a:endParaRPr lang="en-US" dirty="0"/>
           </a:p>
@@ -4226,7 +4238,7 @@
           <a:p>
             <a:fld id="{3A98EE3D-8CD1-4C3F-BD1C-C98C9596463C}" type="slidenum">
               <a:rPr lang="en-US" smtClean="0"/>
-              <a:t>‹nº›</a:t>
+              <a:t>‹#›</a:t>
             </a:fld>
             <a:endParaRPr lang="en-US" dirty="0"/>
           </a:p>
@@ -4279,7 +4291,7 @@
           <a:p>
             <a:fld id="{E68812DA-F765-4142-A6A3-A8ED7235E082}" type="datetime1">
               <a:rPr lang="en-US" smtClean="0"/>
-              <a:t>4/28/2022</a:t>
+              <a:t>5/5/2022</a:t>
             </a:fld>
             <a:endParaRPr lang="en-US" dirty="0"/>
           </a:p>
@@ -4321,7 +4333,7 @@
           <a:p>
             <a:fld id="{3A98EE3D-8CD1-4C3F-BD1C-C98C9596463C}" type="slidenum">
               <a:rPr lang="en-US" smtClean="0"/>
-              <a:t>‹nº›</a:t>
+              <a:t>‹#›</a:t>
             </a:fld>
             <a:endParaRPr lang="en-US" dirty="0"/>
           </a:p>
@@ -4534,7 +4546,7 @@
           <a:p>
             <a:fld id="{3E0277FD-7DE6-41D4-930D-AC99F5AFE54E}" type="datetime1">
               <a:rPr lang="en-US" smtClean="0"/>
-              <a:t>4/28/2022</a:t>
+              <a:t>5/5/2022</a:t>
             </a:fld>
             <a:endParaRPr lang="en-US" dirty="0"/>
           </a:p>
@@ -4577,7 +4589,7 @@
             <a:fld id="{3A98EE3D-8CD1-4C3F-BD1C-C98C9596463C}" type="slidenum">
               <a:rPr lang="en-US" smtClean="0"/>
               <a:pPr/>
-              <a:t>‹nº›</a:t>
+              <a:t>‹#›</a:t>
             </a:fld>
             <a:endParaRPr lang="en-US" dirty="0"/>
           </a:p>
@@ -4840,7 +4852,7 @@
           <a:p>
             <a:fld id="{9EA15526-7079-4B7B-987C-1B5FAE11A0FF}" type="datetime1">
               <a:rPr lang="en-US" smtClean="0"/>
-              <a:t>4/28/2022</a:t>
+              <a:t>5/5/2022</a:t>
             </a:fld>
             <a:endParaRPr lang="en-US" dirty="0"/>
           </a:p>
@@ -4883,7 +4895,7 @@
           <a:p>
             <a:fld id="{3A98EE3D-8CD1-4C3F-BD1C-C98C9596463C}" type="slidenum">
               <a:rPr lang="en-US" smtClean="0"/>
-              <a:t>‹nº›</a:t>
+              <a:t>‹#›</a:t>
             </a:fld>
             <a:endParaRPr lang="en-US" dirty="0"/>
           </a:p>
@@ -5075,7 +5087,7 @@
           <a:p>
             <a:fld id="{073ED0CC-082F-4160-86E5-0D6041F12778}" type="datetime1">
               <a:rPr lang="en-US" smtClean="0"/>
-              <a:t>4/28/2022</a:t>
+              <a:t>5/5/2022</a:t>
             </a:fld>
             <a:endParaRPr lang="en-US" dirty="0"/>
           </a:p>
@@ -5167,7 +5179,7 @@
           <a:p>
             <a:fld id="{3A98EE3D-8CD1-4C3F-BD1C-C98C9596463C}" type="slidenum">
               <a:rPr lang="en-US" smtClean="0"/>
-              <a:t>‹nº›</a:t>
+              <a:t>‹#›</a:t>
             </a:fld>
             <a:endParaRPr lang="en-US" dirty="0"/>
           </a:p>
@@ -5990,7 +6002,7 @@
           </a:effectLst>
           <a:extLst>
             <a:ext uri="{91240B29-F687-4f45-9708-019B960494DF}">
-              <a14:hiddenLine xmlns:a16="http://schemas.microsoft.com/office/drawing/2014/main" xmlns:p14="http://schemas.microsoft.com/office/powerpoint/2010/main" xmlns:a14="http://schemas.microsoft.com/office/drawing/2010/main" xmlns="" w="9525">
+              <a14:hiddenLine xmlns="" xmlns:a14="http://schemas.microsoft.com/office/drawing/2010/main" xmlns:p14="http://schemas.microsoft.com/office/powerpoint/2010/main" xmlns:a16="http://schemas.microsoft.com/office/drawing/2014/main" w="9525">
                 <a:solidFill>
                   <a:srgbClr val="000000"/>
                 </a:solidFill>
@@ -6073,7 +6085,7 @@
           <a:p>
             <a:pPr algn="l"/>
             <a:r>
-              <a:rPr lang="en-US" sz="4000" dirty="0"/>
+              <a:rPr lang="en-US" sz="7200" dirty="0"/>
               <a:t>2048</a:t>
             </a:r>
           </a:p>
@@ -6109,7 +6121,7 @@
           <a:p>
             <a:pPr algn="l"/>
             <a:r>
-              <a:rPr lang="en-US" sz="2300" dirty="0">
+              <a:rPr lang="en-US" sz="2400" dirty="0">
                 <a:solidFill>
                   <a:srgbClr val="5792BA"/>
                 </a:solidFill>
@@ -6197,11 +6209,11 @@
         <p:spPr/>
         <p:txBody>
           <a:bodyPr>
-            <a:normAutofit/>
+            <a:normAutofit lnSpcReduction="10000"/>
           </a:bodyPr>
           <a:lstStyle/>
           <a:p>
-            <a:pPr marL="0" marR="0" indent="0">
+            <a:pPr marL="0" marR="0" indent="0" algn="ctr">
               <a:lnSpc>
                 <a:spcPct val="150000"/>
               </a:lnSpc>
@@ -6221,28 +6233,60 @@
               <a:t>	</a:t>
             </a:r>
             <a:r>
-              <a:rPr lang="pt-BR" sz="2000" dirty="0">
+              <a:rPr lang="pt-BR" sz="2800" dirty="0">
                 <a:effectLst/>
                 <a:latin typeface="Arial" panose="020B0604020202020204" pitchFamily="34" charset="0"/>
               </a:rPr>
-              <a:t>O projeto parte da premissa de que uma escola havia realizado uma prova de matemática com seus alunos </a:t>
-            </a:r>
-            <a:r>
-              <a:rPr lang="pt-BR" sz="2000" dirty="0">
+              <a:t>O projeto parte da premissa de </a:t>
+            </a:r>
+            <a:r>
+              <a:rPr lang="pt-BR" sz="2800">
+                <a:effectLst/>
+                <a:latin typeface="Arial" panose="020B0604020202020204" pitchFamily="34" charset="0"/>
+              </a:rPr>
+              <a:t>que os alunos de uma escola estavam com mal desempenho na matéria de matemática</a:t>
+            </a:r>
+            <a:r>
+              <a:rPr lang="pt-BR" sz="2800">
                 <a:effectLst/>
                 <a:latin typeface="Arial" panose="020B0604020202020204" pitchFamily="34" charset="0"/>
                 <a:ea typeface="Times New Roman" panose="02020603050405020304" pitchFamily="18" charset="0"/>
               </a:rPr>
-              <a:t>da 2ª série onde foi identificada uma dificuldade dos alunos em operações de adição. Com isso em mente a escola decidiu realizar uma parceria conosco com o objetivo de desenvolver um jogo que pudesse ajudar as crianças a aprenderem a matéria de uma forma mais dinâmica e melhorar seu desempenho na matéria. </a:t>
-            </a:r>
-            <a:r>
-              <a:rPr lang="pt-BR" sz="2000" dirty="0">
+              <a:t>. </a:t>
+            </a:r>
+            <a:r>
+              <a:rPr lang="pt-BR" sz="2800" dirty="0">
                 <a:effectLst/>
                 <a:latin typeface="Arial" panose="020B0604020202020204" pitchFamily="34" charset="0"/>
+                <a:ea typeface="Times New Roman" panose="02020603050405020304" pitchFamily="18" charset="0"/>
               </a:rPr>
-              <a:t>Além disso, o projeto serviria como forma de introduzir o meio digital às crianças, podendo gerar maior interesse do aluno pela área.</a:t>
-            </a:r>
-            <a:endParaRPr lang="pt-BR" sz="2000" dirty="0"/>
+              <a:t>Com isso em mente a escola decidiu realizar uma parceria conosco com o objetivo de desenvolver um jogo que pudesse ajudar as crianças a </a:t>
+            </a:r>
+            <a:r>
+              <a:rPr lang="pt-BR" sz="2800">
+                <a:effectLst/>
+                <a:latin typeface="Arial" panose="020B0604020202020204" pitchFamily="34" charset="0"/>
+                <a:ea typeface="Times New Roman" panose="02020603050405020304" pitchFamily="18" charset="0"/>
+              </a:rPr>
+              <a:t>aprenderem de </a:t>
+            </a:r>
+            <a:r>
+              <a:rPr lang="pt-BR" sz="2800" dirty="0">
+                <a:effectLst/>
+                <a:latin typeface="Arial" panose="020B0604020202020204" pitchFamily="34" charset="0"/>
+                <a:ea typeface="Times New Roman" panose="02020603050405020304" pitchFamily="18" charset="0"/>
+              </a:rPr>
+              <a:t>uma forma mais dinâmica e melhorar seu desempenho na </a:t>
+            </a:r>
+            <a:r>
+              <a:rPr lang="pt-BR" sz="2800">
+                <a:effectLst/>
+                <a:latin typeface="Arial" panose="020B0604020202020204" pitchFamily="34" charset="0"/>
+                <a:ea typeface="Times New Roman" panose="02020603050405020304" pitchFamily="18" charset="0"/>
+              </a:rPr>
+              <a:t>matéria.</a:t>
+            </a:r>
+            <a:endParaRPr lang="pt-BR" sz="2800" dirty="0"/>
           </a:p>
         </p:txBody>
       </p:sp>
@@ -6292,7 +6336,12 @@
             <p:ph type="title"/>
           </p:nvPr>
         </p:nvSpPr>
-        <p:spPr/>
+        <p:spPr>
+          <a:xfrm>
+            <a:off x="919118" y="0"/>
+            <a:ext cx="10353762" cy="1257300"/>
+          </a:xfrm>
+        </p:spPr>
         <p:txBody>
           <a:bodyPr/>
           <a:lstStyle/>
@@ -6307,10 +6356,11 @@
       </p:sp>
       <p:pic>
         <p:nvPicPr>
-          <p:cNvPr id="5" name="Content Placeholder 4">
+          <p:cNvPr id="11" name="Content Placeholder 10">
+            <a:hlinkClick r:id="rId2" action="ppaction://hlinkfile"/>
             <a:extLst>
               <a:ext uri="{FF2B5EF4-FFF2-40B4-BE49-F238E27FC236}">
-                <a16:creationId xmlns:a16="http://schemas.microsoft.com/office/drawing/2014/main" id="{7610506C-3471-4029-89FB-19A4228EE5CF}"/>
+                <a16:creationId xmlns:a16="http://schemas.microsoft.com/office/drawing/2014/main" id="{AD0C4225-69F2-48DA-855F-3558477AE93B}"/>
               </a:ext>
             </a:extLst>
           </p:cNvPr>
@@ -6322,15 +6372,15 @@
           </p:nvPr>
         </p:nvPicPr>
         <p:blipFill>
-          <a:blip r:embed="rId2"/>
+          <a:blip r:embed="rId3"/>
           <a:stretch>
             <a:fillRect/>
           </a:stretch>
         </p:blipFill>
         <p:spPr>
           <a:xfrm>
-            <a:off x="2326316" y="1866900"/>
-            <a:ext cx="7539367" cy="4867138"/>
+            <a:off x="2008882" y="1115554"/>
+            <a:ext cx="7924257" cy="5742446"/>
           </a:xfrm>
         </p:spPr>
       </p:pic>
@@ -6383,15 +6433,15 @@
         <p:spPr/>
         <p:txBody>
           <a:bodyPr>
-            <a:normAutofit/>
+            <a:noAutofit/>
           </a:bodyPr>
           <a:lstStyle/>
           <a:p>
             <a:r>
-              <a:rPr lang="en-US" sz="3600" dirty="0"/>
+              <a:rPr lang="en-US" sz="4400" dirty="0"/>
               <a:t>3. Diagrama de Casos de Uso</a:t>
             </a:r>
-            <a:endParaRPr lang="pt-BR" sz="3600" dirty="0"/>
+            <a:endParaRPr lang="pt-BR" sz="4400" dirty="0"/>
           </a:p>
         </p:txBody>
       </p:sp>
@@ -6413,19 +6463,26 @@
         </p:nvSpPr>
         <p:spPr/>
         <p:txBody>
-          <a:bodyPr/>
+          <a:bodyPr>
+            <a:normAutofit/>
+          </a:bodyPr>
           <a:lstStyle/>
           <a:p>
-            <a:endParaRPr lang="pt-BR" dirty="0"/>
+            <a:r>
+              <a:rPr lang="en-US" sz="2800"/>
+              <a:t>Vemos ao lado o Diagrama de Casos de uso do projeto.</a:t>
+            </a:r>
+            <a:endParaRPr lang="pt-BR" sz="2800" dirty="0"/>
           </a:p>
         </p:txBody>
       </p:sp>
       <p:pic>
         <p:nvPicPr>
-          <p:cNvPr id="14" name="Content Placeholder 13">
+          <p:cNvPr id="7" name="Content Placeholder 6">
+            <a:hlinkClick r:id="rId2" action="ppaction://hlinkfile"/>
             <a:extLst>
               <a:ext uri="{FF2B5EF4-FFF2-40B4-BE49-F238E27FC236}">
-                <a16:creationId xmlns:a16="http://schemas.microsoft.com/office/drawing/2014/main" id="{4190D56F-7B0F-4DDB-8D40-C522007CB25A}"/>
+                <a16:creationId xmlns:a16="http://schemas.microsoft.com/office/drawing/2014/main" id="{362F5494-0EC2-4CB6-B2BE-319FF1450316}"/>
               </a:ext>
             </a:extLst>
           </p:cNvPr>
@@ -6437,15 +6494,15 @@
           </p:nvPr>
         </p:nvPicPr>
         <p:blipFill>
-          <a:blip r:embed="rId2"/>
+          <a:blip r:embed="rId3"/>
           <a:stretch>
             <a:fillRect/>
           </a:stretch>
         </p:blipFill>
         <p:spPr>
           <a:xfrm>
-            <a:off x="6096000" y="109602"/>
-            <a:ext cx="4951986" cy="6638795"/>
+            <a:off x="6096000" y="351772"/>
+            <a:ext cx="4590709" cy="6154455"/>
           </a:xfrm>
         </p:spPr>
       </p:pic>
@@ -6502,7 +6559,7 @@
           <a:p>
             <a:r>
               <a:rPr lang="pt-BR"/>
-              <a:t>4. Protótipo de Telas:</a:t>
+              <a:t>4. Demonstração do Projeto:</a:t>
             </a:r>
             <a:endParaRPr lang="pt-BR" dirty="0"/>
           </a:p>
@@ -6510,10 +6567,11 @@
       </p:sp>
       <p:pic>
         <p:nvPicPr>
-          <p:cNvPr id="9" name="Espaço Reservado para Conteúdo 8" descr="Tela de computador com texto preto sobre fundo branco&#10;&#10;Descrição gerada automaticamente">
+          <p:cNvPr id="6" name="Content Placeholder 5">
+            <a:hlinkClick r:id="rId2" action="ppaction://hlinkfile"/>
             <a:extLst>
               <a:ext uri="{FF2B5EF4-FFF2-40B4-BE49-F238E27FC236}">
-                <a16:creationId xmlns:a16="http://schemas.microsoft.com/office/drawing/2014/main" id="{A937E1DB-938B-400B-97A0-9BDF378FD420}"/>
+                <a16:creationId xmlns:a16="http://schemas.microsoft.com/office/drawing/2014/main" id="{CF268B74-0AD9-4597-A503-C40C72A3E386}"/>
               </a:ext>
             </a:extLst>
           </p:cNvPr>
@@ -6525,15 +6583,15 @@
           </p:nvPr>
         </p:nvPicPr>
         <p:blipFill>
-          <a:blip r:embed="rId2"/>
+          <a:blip r:embed="rId3"/>
           <a:stretch>
             <a:fillRect/>
           </a:stretch>
         </p:blipFill>
         <p:spPr>
           <a:xfrm>
-            <a:off x="3483755" y="1837715"/>
-            <a:ext cx="5336688" cy="5020285"/>
+            <a:off x="1191045" y="2334984"/>
+            <a:ext cx="9799262" cy="3276676"/>
           </a:xfrm>
         </p:spPr>
       </p:pic>
@@ -6733,6 +6791,15 @@
 </file>
 
 <file path=customXml/item1.xml><?xml version="1.0" encoding="utf-8"?>
+<p:properties xmlns:p="http://schemas.microsoft.com/office/2006/metadata/properties" xmlns:xsi="http://www.w3.org/2001/XMLSchema-instance" xmlns:pc="http://schemas.microsoft.com/office/infopath/2007/PartnerControls">
+  <documentManagement>
+    <Status xmlns="71af3243-3dd4-4a8d-8c0d-dd76da1f02a5">Not started</Status>
+    <MediaServiceKeyPoints xmlns="71af3243-3dd4-4a8d-8c0d-dd76da1f02a5" xsi:nil="true"/>
+  </documentManagement>
+</p:properties>
+</file>
+
+<file path=customXml/item2.xml><?xml version="1.0" encoding="utf-8"?>
 <ct:contentTypeSchema xmlns:ct="http://schemas.microsoft.com/office/2006/metadata/contentType" xmlns:ma="http://schemas.microsoft.com/office/2006/metadata/properties/metaAttributes" ct:_="" ma:_="" ma:contentTypeName="Document" ma:contentTypeID="0x01010079F111ED35F8CC479449609E8A0923A6" ma:contentTypeVersion="12" ma:contentTypeDescription="Create a new document." ma:contentTypeScope="" ma:versionID="a410dd7f93c95333ffa1b60ed6adedd1">
   <xsd:schema xmlns:xsd="http://www.w3.org/2001/XMLSchema" xmlns:xs="http://www.w3.org/2001/XMLSchema" xmlns:p="http://schemas.microsoft.com/office/2006/metadata/properties" xmlns:ns2="71af3243-3dd4-4a8d-8c0d-dd76da1f02a5" xmlns:ns3="16c05727-aa75-4e4a-9b5f-8a80a1165891" targetNamespace="http://schemas.microsoft.com/office/2006/metadata/properties" ma:root="true" ma:fieldsID="a936d9baba76aa3866493feff160faab" ns2:_="" ns3:_="">
     <xsd:import namespace="71af3243-3dd4-4a8d-8c0d-dd76da1f02a5"/>
@@ -6953,15 +7020,6 @@
 </ct:contentTypeSchema>
 </file>
 
-<file path=customXml/item2.xml><?xml version="1.0" encoding="utf-8"?>
-<p:properties xmlns:p="http://schemas.microsoft.com/office/2006/metadata/properties" xmlns:xsi="http://www.w3.org/2001/XMLSchema-instance" xmlns:pc="http://schemas.microsoft.com/office/infopath/2007/PartnerControls">
-  <documentManagement>
-    <Status xmlns="71af3243-3dd4-4a8d-8c0d-dd76da1f02a5">Not started</Status>
-    <MediaServiceKeyPoints xmlns="71af3243-3dd4-4a8d-8c0d-dd76da1f02a5" xsi:nil="true"/>
-  </documentManagement>
-</p:properties>
-</file>
-
 <file path=customXml/item3.xml><?xml version="1.0" encoding="utf-8"?>
 <?mso-contentType ?>
 <FormTemplates xmlns="http://schemas.microsoft.com/sharepoint/v3/contenttype/forms">
@@ -6972,6 +7030,16 @@
 </file>
 
 <file path=customXml/itemProps1.xml><?xml version="1.0" encoding="utf-8"?>
+<ds:datastoreItem xmlns:ds="http://schemas.openxmlformats.org/officeDocument/2006/customXml" ds:itemID="{F7E70FC5-1855-47AB-8CE1-CB3C873A8988}">
+  <ds:schemaRefs>
+    <ds:schemaRef ds:uri="http://schemas.microsoft.com/office/2006/metadata/properties"/>
+    <ds:schemaRef ds:uri="http://schemas.microsoft.com/office/infopath/2007/PartnerControls"/>
+    <ds:schemaRef ds:uri="71af3243-3dd4-4a8d-8c0d-dd76da1f02a5"/>
+  </ds:schemaRefs>
+</ds:datastoreItem>
+</file>
+
+<file path=customXml/itemProps2.xml><?xml version="1.0" encoding="utf-8"?>
 <ds:datastoreItem xmlns:ds="http://schemas.openxmlformats.org/officeDocument/2006/customXml" ds:itemID="{5560E646-30AD-4BA0-97EA-A7A07DF5499A}">
   <ds:schemaRefs>
     <ds:schemaRef ds:uri="http://schemas.microsoft.com/office/2006/metadata/contentType"/>
@@ -6990,16 +7058,6 @@
 </ds:datastoreItem>
 </file>
 
-<file path=customXml/itemProps2.xml><?xml version="1.0" encoding="utf-8"?>
-<ds:datastoreItem xmlns:ds="http://schemas.openxmlformats.org/officeDocument/2006/customXml" ds:itemID="{F7E70FC5-1855-47AB-8CE1-CB3C873A8988}">
-  <ds:schemaRefs>
-    <ds:schemaRef ds:uri="http://schemas.microsoft.com/office/2006/metadata/properties"/>
-    <ds:schemaRef ds:uri="http://schemas.microsoft.com/office/infopath/2007/PartnerControls"/>
-    <ds:schemaRef ds:uri="71af3243-3dd4-4a8d-8c0d-dd76da1f02a5"/>
-  </ds:schemaRefs>
-</ds:datastoreItem>
-</file>
-
 <file path=customXml/itemProps3.xml><?xml version="1.0" encoding="utf-8"?>
 <ds:datastoreItem xmlns:ds="http://schemas.openxmlformats.org/officeDocument/2006/customXml" ds:itemID="{30CB38EC-895A-4F8F-8F75-E263501ABB5A}">
   <ds:schemaRefs>

</xml_diff>

<commit_message>
Adicionando nova tela e comentando o código
- Atualizando a pasta de imagens de apresentação com as novas imagens atualizadas após a aula do dia 05/05/2022 - Projeto Integrador;
- Foi adicionada a tela de Jogos Salvos, onde o jogador poderá acessar os seus jogos salvos;
- A parte lógica do código foi comentada, cada função de verificação está explicada logo ao lado da função.
</commit_message>
<xml_diff>
--- a/Apresentação jogo 2048.pptx
+++ b/Apresentação jogo 2048.pptx
@@ -6002,7 +6002,7 @@
           </a:effectLst>
           <a:extLst>
             <a:ext uri="{91240B29-F687-4f45-9708-019B960494DF}">
-              <a14:hiddenLine xmlns="" xmlns:a14="http://schemas.microsoft.com/office/drawing/2010/main" xmlns:p14="http://schemas.microsoft.com/office/powerpoint/2010/main" xmlns:a16="http://schemas.microsoft.com/office/drawing/2014/main" w="9525">
+              <a14:hiddenLine xmlns:a16="http://schemas.microsoft.com/office/drawing/2014/main" xmlns:p14="http://schemas.microsoft.com/office/powerpoint/2010/main" xmlns:a14="http://schemas.microsoft.com/office/drawing/2010/main" xmlns="" w="9525">
                 <a:solidFill>
                   <a:srgbClr val="000000"/>
                 </a:solidFill>
@@ -6468,21 +6468,17 @@
           </a:bodyPr>
           <a:lstStyle/>
           <a:p>
-            <a:r>
-              <a:rPr lang="en-US" sz="2800"/>
-              <a:t>Vemos ao lado o Diagrama de Casos de uso do projeto.</a:t>
-            </a:r>
             <a:endParaRPr lang="pt-BR" sz="2800" dirty="0"/>
           </a:p>
         </p:txBody>
       </p:sp>
       <p:pic>
         <p:nvPicPr>
-          <p:cNvPr id="7" name="Content Placeholder 6">
+          <p:cNvPr id="12" name="Content Placeholder 11">
             <a:hlinkClick r:id="rId2" action="ppaction://hlinkfile"/>
             <a:extLst>
               <a:ext uri="{FF2B5EF4-FFF2-40B4-BE49-F238E27FC236}">
-                <a16:creationId xmlns:a16="http://schemas.microsoft.com/office/drawing/2014/main" id="{362F5494-0EC2-4CB6-B2BE-319FF1450316}"/>
+                <a16:creationId xmlns:a16="http://schemas.microsoft.com/office/drawing/2014/main" id="{C72647F5-CF13-4377-9248-195A3E7CFF8D}"/>
               </a:ext>
             </a:extLst>
           </p:cNvPr>
@@ -6501,8 +6497,8 @@
         </p:blipFill>
         <p:spPr>
           <a:xfrm>
-            <a:off x="6096000" y="351772"/>
-            <a:ext cx="4590709" cy="6154455"/>
+            <a:off x="6217594" y="152400"/>
+            <a:ext cx="4888139" cy="6553200"/>
           </a:xfrm>
         </p:spPr>
       </p:pic>
@@ -6791,15 +6787,6 @@
 </file>
 
 <file path=customXml/item1.xml><?xml version="1.0" encoding="utf-8"?>
-<p:properties xmlns:p="http://schemas.microsoft.com/office/2006/metadata/properties" xmlns:xsi="http://www.w3.org/2001/XMLSchema-instance" xmlns:pc="http://schemas.microsoft.com/office/infopath/2007/PartnerControls">
-  <documentManagement>
-    <Status xmlns="71af3243-3dd4-4a8d-8c0d-dd76da1f02a5">Not started</Status>
-    <MediaServiceKeyPoints xmlns="71af3243-3dd4-4a8d-8c0d-dd76da1f02a5" xsi:nil="true"/>
-  </documentManagement>
-</p:properties>
-</file>
-
-<file path=customXml/item2.xml><?xml version="1.0" encoding="utf-8"?>
 <ct:contentTypeSchema xmlns:ct="http://schemas.microsoft.com/office/2006/metadata/contentType" xmlns:ma="http://schemas.microsoft.com/office/2006/metadata/properties/metaAttributes" ct:_="" ma:_="" ma:contentTypeName="Document" ma:contentTypeID="0x01010079F111ED35F8CC479449609E8A0923A6" ma:contentTypeVersion="12" ma:contentTypeDescription="Create a new document." ma:contentTypeScope="" ma:versionID="a410dd7f93c95333ffa1b60ed6adedd1">
   <xsd:schema xmlns:xsd="http://www.w3.org/2001/XMLSchema" xmlns:xs="http://www.w3.org/2001/XMLSchema" xmlns:p="http://schemas.microsoft.com/office/2006/metadata/properties" xmlns:ns2="71af3243-3dd4-4a8d-8c0d-dd76da1f02a5" xmlns:ns3="16c05727-aa75-4e4a-9b5f-8a80a1165891" targetNamespace="http://schemas.microsoft.com/office/2006/metadata/properties" ma:root="true" ma:fieldsID="a936d9baba76aa3866493feff160faab" ns2:_="" ns3:_="">
     <xsd:import namespace="71af3243-3dd4-4a8d-8c0d-dd76da1f02a5"/>
@@ -7020,6 +7007,15 @@
 </ct:contentTypeSchema>
 </file>
 
+<file path=customXml/item2.xml><?xml version="1.0" encoding="utf-8"?>
+<p:properties xmlns:p="http://schemas.microsoft.com/office/2006/metadata/properties" xmlns:xsi="http://www.w3.org/2001/XMLSchema-instance" xmlns:pc="http://schemas.microsoft.com/office/infopath/2007/PartnerControls">
+  <documentManagement>
+    <Status xmlns="71af3243-3dd4-4a8d-8c0d-dd76da1f02a5">Not started</Status>
+    <MediaServiceKeyPoints xmlns="71af3243-3dd4-4a8d-8c0d-dd76da1f02a5" xsi:nil="true"/>
+  </documentManagement>
+</p:properties>
+</file>
+
 <file path=customXml/item3.xml><?xml version="1.0" encoding="utf-8"?>
 <?mso-contentType ?>
 <FormTemplates xmlns="http://schemas.microsoft.com/sharepoint/v3/contenttype/forms">
@@ -7030,16 +7026,6 @@
 </file>
 
 <file path=customXml/itemProps1.xml><?xml version="1.0" encoding="utf-8"?>
-<ds:datastoreItem xmlns:ds="http://schemas.openxmlformats.org/officeDocument/2006/customXml" ds:itemID="{F7E70FC5-1855-47AB-8CE1-CB3C873A8988}">
-  <ds:schemaRefs>
-    <ds:schemaRef ds:uri="http://schemas.microsoft.com/office/2006/metadata/properties"/>
-    <ds:schemaRef ds:uri="http://schemas.microsoft.com/office/infopath/2007/PartnerControls"/>
-    <ds:schemaRef ds:uri="71af3243-3dd4-4a8d-8c0d-dd76da1f02a5"/>
-  </ds:schemaRefs>
-</ds:datastoreItem>
-</file>
-
-<file path=customXml/itemProps2.xml><?xml version="1.0" encoding="utf-8"?>
 <ds:datastoreItem xmlns:ds="http://schemas.openxmlformats.org/officeDocument/2006/customXml" ds:itemID="{5560E646-30AD-4BA0-97EA-A7A07DF5499A}">
   <ds:schemaRefs>
     <ds:schemaRef ds:uri="http://schemas.microsoft.com/office/2006/metadata/contentType"/>
@@ -7058,6 +7044,16 @@
 </ds:datastoreItem>
 </file>
 
+<file path=customXml/itemProps2.xml><?xml version="1.0" encoding="utf-8"?>
+<ds:datastoreItem xmlns:ds="http://schemas.openxmlformats.org/officeDocument/2006/customXml" ds:itemID="{F7E70FC5-1855-47AB-8CE1-CB3C873A8988}">
+  <ds:schemaRefs>
+    <ds:schemaRef ds:uri="http://schemas.microsoft.com/office/2006/metadata/properties"/>
+    <ds:schemaRef ds:uri="http://schemas.microsoft.com/office/infopath/2007/PartnerControls"/>
+    <ds:schemaRef ds:uri="71af3243-3dd4-4a8d-8c0d-dd76da1f02a5"/>
+  </ds:schemaRefs>
+</ds:datastoreItem>
+</file>
+
 <file path=customXml/itemProps3.xml><?xml version="1.0" encoding="utf-8"?>
 <ds:datastoreItem xmlns:ds="http://schemas.openxmlformats.org/officeDocument/2006/customXml" ds:itemID="{30CB38EC-895A-4F8F-8F75-E263501ABB5A}">
   <ds:schemaRefs>

</xml_diff>